<commit_message>
Added more on electrostatic equations
</commit_message>
<xml_diff>
--- a/images/DrawingImages.pptx
+++ b/images/DrawingImages.pptx
@@ -5,10 +5,11 @@
     <p:sldMasterId id="2147483648" r:id="rId1"/>
   </p:sldMasterIdLst>
   <p:notesMasterIdLst>
-    <p:notesMasterId r:id="rId3"/>
+    <p:notesMasterId r:id="rId4"/>
   </p:notesMasterIdLst>
   <p:sldIdLst>
     <p:sldId id="258" r:id="rId2"/>
+    <p:sldId id="259" r:id="rId3"/>
   </p:sldIdLst>
   <p:sldSz cx="12192000" cy="6858000"/>
   <p:notesSz cx="6858000" cy="9144000"/>
@@ -107,6 +108,11 @@
       </a:defRPr>
     </a:lvl9pPr>
   </p:defaultTextStyle>
+  <p:extLst>
+    <p:ext uri="{EFAFB233-063F-42B5-8137-9DF3F51BA10A}">
+      <p15:sldGuideLst xmlns:p15="http://schemas.microsoft.com/office/powerpoint/2012/main"/>
+    </p:ext>
+  </p:extLst>
 </p:presentation>
 </file>
 
@@ -192,7 +198,7 @@
           <a:p>
             <a:fld id="{5099C167-FF08-4FBF-9CB6-1838149D8E98}" type="datetimeFigureOut">
               <a:rPr lang="en-US" smtClean="0"/>
-              <a:t>6/21/2018</a:t>
+              <a:t>8/21/2018</a:t>
             </a:fld>
             <a:endParaRPr lang="en-US"/>
           </a:p>
@@ -701,7 +707,7 @@
           <a:p>
             <a:fld id="{B0A27DF5-E343-4B6B-B315-5C0477F75847}" type="datetimeFigureOut">
               <a:rPr lang="en-US" smtClean="0"/>
-              <a:t>6/21/2018</a:t>
+              <a:t>8/21/2018</a:t>
             </a:fld>
             <a:endParaRPr lang="en-US"/>
           </a:p>
@@ -899,7 +905,7 @@
           <a:p>
             <a:fld id="{B0A27DF5-E343-4B6B-B315-5C0477F75847}" type="datetimeFigureOut">
               <a:rPr lang="en-US" smtClean="0"/>
-              <a:t>6/21/2018</a:t>
+              <a:t>8/21/2018</a:t>
             </a:fld>
             <a:endParaRPr lang="en-US"/>
           </a:p>
@@ -1107,7 +1113,7 @@
           <a:p>
             <a:fld id="{B0A27DF5-E343-4B6B-B315-5C0477F75847}" type="datetimeFigureOut">
               <a:rPr lang="en-US" smtClean="0"/>
-              <a:t>6/21/2018</a:t>
+              <a:t>8/21/2018</a:t>
             </a:fld>
             <a:endParaRPr lang="en-US"/>
           </a:p>
@@ -1305,7 +1311,7 @@
           <a:p>
             <a:fld id="{B0A27DF5-E343-4B6B-B315-5C0477F75847}" type="datetimeFigureOut">
               <a:rPr lang="en-US" smtClean="0"/>
-              <a:t>6/21/2018</a:t>
+              <a:t>8/21/2018</a:t>
             </a:fld>
             <a:endParaRPr lang="en-US"/>
           </a:p>
@@ -1580,7 +1586,7 @@
           <a:p>
             <a:fld id="{B0A27DF5-E343-4B6B-B315-5C0477F75847}" type="datetimeFigureOut">
               <a:rPr lang="en-US" smtClean="0"/>
-              <a:t>6/21/2018</a:t>
+              <a:t>8/21/2018</a:t>
             </a:fld>
             <a:endParaRPr lang="en-US"/>
           </a:p>
@@ -1845,7 +1851,7 @@
           <a:p>
             <a:fld id="{B0A27DF5-E343-4B6B-B315-5C0477F75847}" type="datetimeFigureOut">
               <a:rPr lang="en-US" smtClean="0"/>
-              <a:t>6/21/2018</a:t>
+              <a:t>8/21/2018</a:t>
             </a:fld>
             <a:endParaRPr lang="en-US"/>
           </a:p>
@@ -2257,7 +2263,7 @@
           <a:p>
             <a:fld id="{B0A27DF5-E343-4B6B-B315-5C0477F75847}" type="datetimeFigureOut">
               <a:rPr lang="en-US" smtClean="0"/>
-              <a:t>6/21/2018</a:t>
+              <a:t>8/21/2018</a:t>
             </a:fld>
             <a:endParaRPr lang="en-US"/>
           </a:p>
@@ -2398,7 +2404,7 @@
           <a:p>
             <a:fld id="{B0A27DF5-E343-4B6B-B315-5C0477F75847}" type="datetimeFigureOut">
               <a:rPr lang="en-US" smtClean="0"/>
-              <a:t>6/21/2018</a:t>
+              <a:t>8/21/2018</a:t>
             </a:fld>
             <a:endParaRPr lang="en-US"/>
           </a:p>
@@ -2511,7 +2517,7 @@
           <a:p>
             <a:fld id="{B0A27DF5-E343-4B6B-B315-5C0477F75847}" type="datetimeFigureOut">
               <a:rPr lang="en-US" smtClean="0"/>
-              <a:t>6/21/2018</a:t>
+              <a:t>8/21/2018</a:t>
             </a:fld>
             <a:endParaRPr lang="en-US"/>
           </a:p>
@@ -2822,7 +2828,7 @@
           <a:p>
             <a:fld id="{B0A27DF5-E343-4B6B-B315-5C0477F75847}" type="datetimeFigureOut">
               <a:rPr lang="en-US" smtClean="0"/>
-              <a:t>6/21/2018</a:t>
+              <a:t>8/21/2018</a:t>
             </a:fld>
             <a:endParaRPr lang="en-US"/>
           </a:p>
@@ -3110,7 +3116,7 @@
           <a:p>
             <a:fld id="{B0A27DF5-E343-4B6B-B315-5C0477F75847}" type="datetimeFigureOut">
               <a:rPr lang="en-US" smtClean="0"/>
-              <a:t>6/21/2018</a:t>
+              <a:t>8/21/2018</a:t>
             </a:fld>
             <a:endParaRPr lang="en-US"/>
           </a:p>
@@ -3351,7 +3357,7 @@
           <a:p>
             <a:fld id="{B0A27DF5-E343-4B6B-B315-5C0477F75847}" type="datetimeFigureOut">
               <a:rPr lang="en-US" smtClean="0"/>
-              <a:t>6/21/2018</a:t>
+              <a:t>8/21/2018</a:t>
             </a:fld>
             <a:endParaRPr lang="en-US"/>
           </a:p>
@@ -3850,8 +3856,8 @@
           </a:fontRef>
         </p:style>
       </p:cxnSp>
-      <mc:AlternateContent xmlns:mc="http://schemas.openxmlformats.org/markup-compatibility/2006">
-        <mc:Choice xmlns:a14="http://schemas.microsoft.com/office/drawing/2010/main" Requires="a14">
+      <mc:AlternateContent xmlns:mc="http://schemas.openxmlformats.org/markup-compatibility/2006" xmlns:a14="http://schemas.microsoft.com/office/drawing/2010/main">
+        <mc:Choice Requires="a14">
           <p:sp>
             <p:nvSpPr>
               <p:cNvPr id="52" name="TextBox 51">
@@ -3932,7 +3938,7 @@
             </p:txBody>
           </p:sp>
         </mc:Choice>
-        <mc:Fallback>
+        <mc:Fallback xmlns="">
           <p:sp>
             <p:nvSpPr>
               <p:cNvPr id="52" name="TextBox 51">
@@ -5407,8 +5413,8 @@
           </p:style>
         </p:cxnSp>
       </p:grpSp>
-      <mc:AlternateContent xmlns:mc="http://schemas.openxmlformats.org/markup-compatibility/2006">
-        <mc:Choice xmlns:a14="http://schemas.microsoft.com/office/drawing/2010/main" Requires="a14">
+      <mc:AlternateContent xmlns:mc="http://schemas.openxmlformats.org/markup-compatibility/2006" xmlns:a14="http://schemas.microsoft.com/office/drawing/2010/main">
+        <mc:Choice Requires="a14">
           <p:sp>
             <p:nvSpPr>
               <p:cNvPr id="106" name="TextBox 105">
@@ -5489,7 +5495,7 @@
             </p:txBody>
           </p:sp>
         </mc:Choice>
-        <mc:Fallback>
+        <mc:Fallback xmlns="">
           <p:sp>
             <p:nvSpPr>
               <p:cNvPr id="106" name="TextBox 105">
@@ -6074,8 +6080,8 @@
           </a:fontRef>
         </p:style>
       </p:cxnSp>
-      <mc:AlternateContent xmlns:mc="http://schemas.openxmlformats.org/markup-compatibility/2006">
-        <mc:Choice xmlns:a14="http://schemas.microsoft.com/office/drawing/2010/main" Requires="a14">
+      <mc:AlternateContent xmlns:mc="http://schemas.openxmlformats.org/markup-compatibility/2006" xmlns:a14="http://schemas.microsoft.com/office/drawing/2010/main">
+        <mc:Choice Requires="a14">
           <p:sp>
             <p:nvSpPr>
               <p:cNvPr id="176" name="TextBox 175">
@@ -6156,7 +6162,7 @@
             </p:txBody>
           </p:sp>
         </mc:Choice>
-        <mc:Fallback>
+        <mc:Fallback xmlns="">
           <p:sp>
             <p:nvSpPr>
               <p:cNvPr id="176" name="TextBox 175">
@@ -7587,8 +7593,8 @@
           </p:style>
         </p:cxnSp>
       </p:grpSp>
-      <mc:AlternateContent xmlns:mc="http://schemas.openxmlformats.org/markup-compatibility/2006">
-        <mc:Choice xmlns:a14="http://schemas.microsoft.com/office/drawing/2010/main" Requires="a14">
+      <mc:AlternateContent xmlns:mc="http://schemas.openxmlformats.org/markup-compatibility/2006" xmlns:a14="http://schemas.microsoft.com/office/drawing/2010/main">
+        <mc:Choice Requires="a14">
           <p:sp>
             <p:nvSpPr>
               <p:cNvPr id="210" name="TextBox 209">
@@ -7669,7 +7675,7 @@
             </p:txBody>
           </p:sp>
         </mc:Choice>
-        <mc:Fallback>
+        <mc:Fallback xmlns="">
           <p:sp>
             <p:nvSpPr>
               <p:cNvPr id="210" name="TextBox 209">
@@ -8279,6 +8285,86 @@
     <p:extLst>
       <p:ext uri="{BB962C8B-B14F-4D97-AF65-F5344CB8AC3E}">
         <p14:creationId xmlns:p14="http://schemas.microsoft.com/office/powerpoint/2010/main" val="2719580465"/>
+      </p:ext>
+    </p:extLst>
+  </p:cSld>
+  <p:clrMapOvr>
+    <a:masterClrMapping/>
+  </p:clrMapOvr>
+</p:sld>
+</file>
+
+<file path=ppt/slides/slide2.xml><?xml version="1.0" encoding="utf-8"?>
+<p:sld xmlns:a="http://schemas.openxmlformats.org/drawingml/2006/main" xmlns:r="http://schemas.openxmlformats.org/officeDocument/2006/relationships" xmlns:p="http://schemas.openxmlformats.org/presentationml/2006/main">
+  <p:cSld>
+    <p:spTree>
+      <p:nvGrpSpPr>
+        <p:cNvPr id="1" name=""/>
+        <p:cNvGrpSpPr/>
+        <p:nvPr/>
+      </p:nvGrpSpPr>
+      <p:grpSpPr>
+        <a:xfrm>
+          <a:off x="0" y="0"/>
+          <a:ext cx="0" cy="0"/>
+          <a:chOff x="0" y="0"/>
+          <a:chExt cx="0" cy="0"/>
+        </a:xfrm>
+      </p:grpSpPr>
+      <p:sp>
+        <p:nvSpPr>
+          <p:cNvPr id="2" name="Title 1">
+            <a:extLst>
+              <a:ext uri="{FF2B5EF4-FFF2-40B4-BE49-F238E27FC236}">
+                <a16:creationId xmlns:a16="http://schemas.microsoft.com/office/drawing/2014/main" id="{3F250399-4992-4CA1-A519-1027FDFA817D}"/>
+              </a:ext>
+            </a:extLst>
+          </p:cNvPr>
+          <p:cNvSpPr>
+            <a:spLocks noGrp="1"/>
+          </p:cNvSpPr>
+          <p:nvPr>
+            <p:ph type="title"/>
+          </p:nvPr>
+        </p:nvSpPr>
+        <p:spPr/>
+        <p:txBody>
+          <a:bodyPr/>
+          <a:lstStyle/>
+          <a:p>
+            <a:endParaRPr lang="en-US"/>
+          </a:p>
+        </p:txBody>
+      </p:sp>
+      <p:sp>
+        <p:nvSpPr>
+          <p:cNvPr id="3" name="Content Placeholder 2">
+            <a:extLst>
+              <a:ext uri="{FF2B5EF4-FFF2-40B4-BE49-F238E27FC236}">
+                <a16:creationId xmlns:a16="http://schemas.microsoft.com/office/drawing/2014/main" id="{428C9512-49F9-4F7D-B724-4842A0220F74}"/>
+              </a:ext>
+            </a:extLst>
+          </p:cNvPr>
+          <p:cNvSpPr>
+            <a:spLocks noGrp="1"/>
+          </p:cNvSpPr>
+          <p:nvPr>
+            <p:ph idx="1"/>
+          </p:nvPr>
+        </p:nvSpPr>
+        <p:spPr/>
+        <p:txBody>
+          <a:bodyPr/>
+          <a:lstStyle/>
+          <a:p>
+            <a:endParaRPr lang="en-US"/>
+          </a:p>
+        </p:txBody>
+      </p:sp>
+    </p:spTree>
+    <p:extLst>
+      <p:ext uri="{BB962C8B-B14F-4D97-AF65-F5344CB8AC3E}">
+        <p14:creationId xmlns:p14="http://schemas.microsoft.com/office/powerpoint/2010/main" val="2504061051"/>
       </p:ext>
     </p:extLst>
   </p:cSld>

</xml_diff>

<commit_message>
Updated the Circuit Diagram
</commit_message>
<xml_diff>
--- a/images/DrawingImages.pptx
+++ b/images/DrawingImages.pptx
@@ -11910,71 +11910,6 @@
           </a:p>
         </p:txBody>
       </p:sp>
-      <p:sp>
-        <p:nvSpPr>
-          <p:cNvPr id="13" name="TextBox 12">
-            <a:extLst>
-              <a:ext uri="{FF2B5EF4-FFF2-40B4-BE49-F238E27FC236}">
-                <a16:creationId xmlns:a16="http://schemas.microsoft.com/office/drawing/2014/main" id="{C4F0A200-F001-48F2-BEC3-2B74CFF9D2CC}"/>
-              </a:ext>
-            </a:extLst>
-          </p:cNvPr>
-          <p:cNvSpPr txBox="1"/>
-          <p:nvPr/>
-        </p:nvSpPr>
-        <p:spPr>
-          <a:xfrm>
-            <a:off x="9884185" y="2805672"/>
-            <a:ext cx="1260679" cy="523220"/>
-          </a:xfrm>
-          <a:prstGeom prst="rect">
-            <a:avLst/>
-          </a:prstGeom>
-          <a:noFill/>
-        </p:spPr>
-        <p:txBody>
-          <a:bodyPr wrap="square" rtlCol="0">
-            <a:spAutoFit/>
-          </a:bodyPr>
-          <a:lstStyle/>
-          <a:p>
-            <a:pPr marL="0" marR="0" lvl="0" indent="0" algn="l" defTabSz="914400" rtl="0" eaLnBrk="1" fontAlgn="auto" latinLnBrk="0" hangingPunct="1">
-              <a:lnSpc>
-                <a:spcPct val="100000"/>
-              </a:lnSpc>
-              <a:spcBef>
-                <a:spcPts val="0"/>
-              </a:spcBef>
-              <a:spcAft>
-                <a:spcPts val="0"/>
-              </a:spcAft>
-              <a:buClrTx/>
-              <a:buSzTx/>
-              <a:buFontTx/>
-              <a:buNone/>
-              <a:tabLst/>
-              <a:defRPr/>
-            </a:pPr>
-            <a:r>
-              <a:rPr kumimoji="0" lang="en-US" sz="2800" b="0" i="0" u="none" strike="noStrike" kern="1200" cap="none" spc="0" normalizeH="0" baseline="0" noProof="0" dirty="0">
-                <a:ln>
-                  <a:noFill/>
-                </a:ln>
-                <a:solidFill>
-                  <a:prstClr val="black"/>
-                </a:solidFill>
-                <a:effectLst/>
-                <a:uLnTx/>
-                <a:uFillTx/>
-                <a:latin typeface="Calibri" panose="020F0502020204030204"/>
-                <a:ea typeface="+mn-ea"/>
-                <a:cs typeface="+mn-cs"/>
-              </a:rPr>
-              <a:t>BLG</a:t>
-            </a:r>
-          </a:p>
-        </p:txBody>
-      </p:sp>
       <p:cxnSp>
         <p:nvCxnSpPr>
           <p:cNvPr id="20" name="Straight Connector 19">
@@ -12706,7 +12641,7 @@
                 <a:ea typeface="+mn-ea"/>
                 <a:cs typeface="+mn-cs"/>
               </a:rPr>
-              <a:t>G</a:t>
+              <a:t>B</a:t>
             </a:r>
           </a:p>
         </p:txBody>
@@ -14219,8 +14154,8 @@
           </a:fontRef>
         </p:style>
       </p:cxnSp>
-      <mc:AlternateContent xmlns:mc="http://schemas.openxmlformats.org/markup-compatibility/2006">
-        <mc:Choice xmlns:a14="http://schemas.microsoft.com/office/drawing/2010/main" Requires="a14">
+      <mc:AlternateContent xmlns:mc="http://schemas.openxmlformats.org/markup-compatibility/2006" xmlns:a14="http://schemas.microsoft.com/office/drawing/2010/main">
+        <mc:Choice Requires="a14">
           <p:sp>
             <p:nvSpPr>
               <p:cNvPr id="75" name="TextBox 74">
@@ -14491,7 +14426,7 @@
             </p:txBody>
           </p:sp>
         </mc:Choice>
-        <mc:Fallback>
+        <mc:Fallback xmlns="">
           <p:sp>
             <p:nvSpPr>
               <p:cNvPr id="75" name="TextBox 74">
@@ -14901,8 +14836,8 @@
           </p:sp>
         </mc:Fallback>
       </mc:AlternateContent>
-      <mc:AlternateContent xmlns:mc="http://schemas.openxmlformats.org/markup-compatibility/2006">
-        <mc:Choice xmlns:a14="http://schemas.microsoft.com/office/drawing/2010/main" Requires="a14">
+      <mc:AlternateContent xmlns:mc="http://schemas.openxmlformats.org/markup-compatibility/2006" xmlns:a14="http://schemas.microsoft.com/office/drawing/2010/main">
+        <mc:Choice Requires="a14">
           <p:sp>
             <p:nvSpPr>
               <p:cNvPr id="66" name="TextBox 65">
@@ -15009,7 +14944,7 @@
             </p:txBody>
           </p:sp>
         </mc:Choice>
-        <mc:Fallback>
+        <mc:Fallback xmlns="">
           <p:sp>
             <p:nvSpPr>
               <p:cNvPr id="66" name="TextBox 65">
@@ -15229,6 +15164,455 @@
           </a:p>
         </p:txBody>
       </p:sp>
+      <p:sp>
+        <p:nvSpPr>
+          <p:cNvPr id="61" name="TextBox 60">
+            <a:extLst>
+              <a:ext uri="{FF2B5EF4-FFF2-40B4-BE49-F238E27FC236}">
+                <a16:creationId xmlns:a16="http://schemas.microsoft.com/office/drawing/2014/main" id="{16A38549-9569-46AE-B504-1F205C73EFF6}"/>
+              </a:ext>
+            </a:extLst>
+          </p:cNvPr>
+          <p:cNvSpPr txBox="1"/>
+          <p:nvPr/>
+        </p:nvSpPr>
+        <p:spPr>
+          <a:xfrm>
+            <a:off x="10862477" y="2242703"/>
+            <a:ext cx="1079766" cy="523220"/>
+          </a:xfrm>
+          <a:prstGeom prst="rect">
+            <a:avLst/>
+          </a:prstGeom>
+          <a:noFill/>
+        </p:spPr>
+        <p:txBody>
+          <a:bodyPr wrap="square" rtlCol="0">
+            <a:spAutoFit/>
+          </a:bodyPr>
+          <a:lstStyle/>
+          <a:p>
+            <a:pPr marL="0" marR="0" lvl="0" indent="0" algn="l" defTabSz="914400" rtl="0" eaLnBrk="1" fontAlgn="auto" latinLnBrk="0" hangingPunct="1">
+              <a:lnSpc>
+                <a:spcPct val="100000"/>
+              </a:lnSpc>
+              <a:spcBef>
+                <a:spcPts val="0"/>
+              </a:spcBef>
+              <a:spcAft>
+                <a:spcPts val="0"/>
+              </a:spcAft>
+              <a:buClrTx/>
+              <a:buSzTx/>
+              <a:buFontTx/>
+              <a:buNone/>
+              <a:tabLst/>
+              <a:defRPr/>
+            </a:pPr>
+            <a:r>
+              <a:rPr kumimoji="0" lang="en-US" sz="2800" b="0" i="0" u="none" strike="noStrike" kern="1200" cap="none" spc="0" normalizeH="0" baseline="0" noProof="0" dirty="0">
+                <a:ln>
+                  <a:noFill/>
+                </a:ln>
+                <a:solidFill>
+                  <a:prstClr val="black"/>
+                </a:solidFill>
+                <a:effectLst/>
+                <a:uLnTx/>
+                <a:uFillTx/>
+                <a:latin typeface="Calibri" panose="020F0502020204030204"/>
+                <a:ea typeface="+mn-ea"/>
+                <a:cs typeface="+mn-cs"/>
+              </a:rPr>
+              <a:t>V</a:t>
+            </a:r>
+            <a:r>
+              <a:rPr lang="en-US" sz="2800" baseline="-25000" dirty="0">
+                <a:solidFill>
+                  <a:prstClr val="black"/>
+                </a:solidFill>
+                <a:latin typeface="Calibri" panose="020F0502020204030204"/>
+              </a:rPr>
+              <a:t>t</a:t>
+            </a:r>
+            <a:endParaRPr kumimoji="0" lang="en-US" sz="4000" b="0" i="0" u="none" strike="noStrike" kern="1200" cap="none" spc="0" normalizeH="0" baseline="0" noProof="0" dirty="0">
+              <a:ln>
+                <a:noFill/>
+              </a:ln>
+              <a:solidFill>
+                <a:prstClr val="black"/>
+              </a:solidFill>
+              <a:effectLst/>
+              <a:uLnTx/>
+              <a:uFillTx/>
+              <a:latin typeface="Calibri" panose="020F0502020204030204"/>
+              <a:ea typeface="+mn-ea"/>
+              <a:cs typeface="+mn-cs"/>
+            </a:endParaRPr>
+          </a:p>
+        </p:txBody>
+      </p:sp>
+      <p:sp>
+        <p:nvSpPr>
+          <p:cNvPr id="67" name="TextBox 66">
+            <a:extLst>
+              <a:ext uri="{FF2B5EF4-FFF2-40B4-BE49-F238E27FC236}">
+                <a16:creationId xmlns:a16="http://schemas.microsoft.com/office/drawing/2014/main" id="{C32E0237-4A21-4195-A1A5-8099445D1947}"/>
+              </a:ext>
+            </a:extLst>
+          </p:cNvPr>
+          <p:cNvSpPr txBox="1"/>
+          <p:nvPr/>
+        </p:nvSpPr>
+        <p:spPr>
+          <a:xfrm>
+            <a:off x="10848346" y="3175159"/>
+            <a:ext cx="1079766" cy="523220"/>
+          </a:xfrm>
+          <a:prstGeom prst="rect">
+            <a:avLst/>
+          </a:prstGeom>
+          <a:noFill/>
+        </p:spPr>
+        <p:txBody>
+          <a:bodyPr wrap="square" rtlCol="0">
+            <a:spAutoFit/>
+          </a:bodyPr>
+          <a:lstStyle/>
+          <a:p>
+            <a:pPr marL="0" marR="0" lvl="0" indent="0" algn="l" defTabSz="914400" rtl="0" eaLnBrk="1" fontAlgn="auto" latinLnBrk="0" hangingPunct="1">
+              <a:lnSpc>
+                <a:spcPct val="100000"/>
+              </a:lnSpc>
+              <a:spcBef>
+                <a:spcPts val="0"/>
+              </a:spcBef>
+              <a:spcAft>
+                <a:spcPts val="0"/>
+              </a:spcAft>
+              <a:buClrTx/>
+              <a:buSzTx/>
+              <a:buFontTx/>
+              <a:buNone/>
+              <a:tabLst/>
+              <a:defRPr/>
+            </a:pPr>
+            <a:r>
+              <a:rPr kumimoji="0" lang="en-US" sz="2800" b="0" i="0" u="none" strike="noStrike" kern="1200" cap="none" spc="0" normalizeH="0" baseline="0" noProof="0" dirty="0" err="1">
+                <a:ln>
+                  <a:noFill/>
+                </a:ln>
+                <a:solidFill>
+                  <a:prstClr val="black"/>
+                </a:solidFill>
+                <a:effectLst/>
+                <a:uLnTx/>
+                <a:uFillTx/>
+                <a:latin typeface="Calibri" panose="020F0502020204030204"/>
+                <a:ea typeface="+mn-ea"/>
+                <a:cs typeface="+mn-cs"/>
+              </a:rPr>
+              <a:t>V</a:t>
+            </a:r>
+            <a:r>
+              <a:rPr kumimoji="0" lang="en-US" sz="2800" b="0" i="0" u="none" strike="noStrike" kern="1200" cap="none" spc="0" normalizeH="0" baseline="-25000" noProof="0" dirty="0" err="1">
+                <a:ln>
+                  <a:noFill/>
+                </a:ln>
+                <a:solidFill>
+                  <a:prstClr val="black"/>
+                </a:solidFill>
+                <a:effectLst/>
+                <a:uLnTx/>
+                <a:uFillTx/>
+                <a:latin typeface="Calibri" panose="020F0502020204030204"/>
+                <a:ea typeface="+mn-ea"/>
+                <a:cs typeface="+mn-cs"/>
+              </a:rPr>
+              <a:t>b</a:t>
+            </a:r>
+            <a:endParaRPr kumimoji="0" lang="en-US" sz="4000" b="0" i="0" u="none" strike="noStrike" kern="1200" cap="none" spc="0" normalizeH="0" baseline="0" noProof="0" dirty="0">
+              <a:ln>
+                <a:noFill/>
+              </a:ln>
+              <a:solidFill>
+                <a:prstClr val="black"/>
+              </a:solidFill>
+              <a:effectLst/>
+              <a:uLnTx/>
+              <a:uFillTx/>
+              <a:latin typeface="Calibri" panose="020F0502020204030204"/>
+              <a:ea typeface="+mn-ea"/>
+              <a:cs typeface="+mn-cs"/>
+            </a:endParaRPr>
+          </a:p>
+        </p:txBody>
+      </p:sp>
+      <p:sp>
+        <p:nvSpPr>
+          <p:cNvPr id="68" name="TextBox 67">
+            <a:extLst>
+              <a:ext uri="{FF2B5EF4-FFF2-40B4-BE49-F238E27FC236}">
+                <a16:creationId xmlns:a16="http://schemas.microsoft.com/office/drawing/2014/main" id="{78F820FE-EAC2-480E-A7C6-3AB8C4BEDCE0}"/>
+              </a:ext>
+            </a:extLst>
+          </p:cNvPr>
+          <p:cNvSpPr txBox="1"/>
+          <p:nvPr/>
+        </p:nvSpPr>
+        <p:spPr>
+          <a:xfrm>
+            <a:off x="11215314" y="3155085"/>
+            <a:ext cx="1079766" cy="523220"/>
+          </a:xfrm>
+          <a:prstGeom prst="rect">
+            <a:avLst/>
+          </a:prstGeom>
+          <a:noFill/>
+        </p:spPr>
+        <p:txBody>
+          <a:bodyPr wrap="square" rtlCol="0">
+            <a:spAutoFit/>
+          </a:bodyPr>
+          <a:lstStyle/>
+          <a:p>
+            <a:pPr marL="0" marR="0" lvl="0" indent="0" algn="l" defTabSz="914400" rtl="0" eaLnBrk="1" fontAlgn="auto" latinLnBrk="0" hangingPunct="1">
+              <a:lnSpc>
+                <a:spcPct val="100000"/>
+              </a:lnSpc>
+              <a:spcBef>
+                <a:spcPts val="0"/>
+              </a:spcBef>
+              <a:spcAft>
+                <a:spcPts val="0"/>
+              </a:spcAft>
+              <a:buClrTx/>
+              <a:buSzTx/>
+              <a:buFontTx/>
+              <a:buNone/>
+              <a:tabLst/>
+              <a:defRPr/>
+            </a:pPr>
+            <a:r>
+              <a:rPr lang="en-US" sz="2800" dirty="0">
+                <a:solidFill>
+                  <a:prstClr val="black"/>
+                </a:solidFill>
+                <a:latin typeface="Calibri" panose="020F0502020204030204"/>
+              </a:rPr>
+              <a:t>,n</a:t>
+            </a:r>
+            <a:r>
+              <a:rPr kumimoji="0" lang="en-US" sz="2800" b="0" i="0" u="none" strike="noStrike" kern="1200" cap="none" spc="0" normalizeH="0" baseline="-25000" noProof="0" dirty="0">
+                <a:ln>
+                  <a:noFill/>
+                </a:ln>
+                <a:solidFill>
+                  <a:prstClr val="black"/>
+                </a:solidFill>
+                <a:effectLst/>
+                <a:uLnTx/>
+                <a:uFillTx/>
+                <a:latin typeface="Calibri" panose="020F0502020204030204"/>
+                <a:ea typeface="+mn-ea"/>
+                <a:cs typeface="+mn-cs"/>
+              </a:rPr>
+              <a:t>b</a:t>
+            </a:r>
+            <a:endParaRPr kumimoji="0" lang="en-US" sz="4000" b="0" i="0" u="none" strike="noStrike" kern="1200" cap="none" spc="0" normalizeH="0" baseline="0" noProof="0" dirty="0">
+              <a:ln>
+                <a:noFill/>
+              </a:ln>
+              <a:solidFill>
+                <a:prstClr val="black"/>
+              </a:solidFill>
+              <a:effectLst/>
+              <a:uLnTx/>
+              <a:uFillTx/>
+              <a:latin typeface="Calibri" panose="020F0502020204030204"/>
+              <a:ea typeface="+mn-ea"/>
+              <a:cs typeface="+mn-cs"/>
+            </a:endParaRPr>
+          </a:p>
+        </p:txBody>
+      </p:sp>
+      <p:sp>
+        <p:nvSpPr>
+          <p:cNvPr id="69" name="TextBox 68">
+            <a:extLst>
+              <a:ext uri="{FF2B5EF4-FFF2-40B4-BE49-F238E27FC236}">
+                <a16:creationId xmlns:a16="http://schemas.microsoft.com/office/drawing/2014/main" id="{1FB45B17-23AE-493C-8C53-3BFECD7087E2}"/>
+              </a:ext>
+            </a:extLst>
+          </p:cNvPr>
+          <p:cNvSpPr txBox="1"/>
+          <p:nvPr/>
+        </p:nvSpPr>
+        <p:spPr>
+          <a:xfrm>
+            <a:off x="11177784" y="2263512"/>
+            <a:ext cx="1079766" cy="523220"/>
+          </a:xfrm>
+          <a:prstGeom prst="rect">
+            <a:avLst/>
+          </a:prstGeom>
+          <a:noFill/>
+        </p:spPr>
+        <p:txBody>
+          <a:bodyPr wrap="square" rtlCol="0">
+            <a:spAutoFit/>
+          </a:bodyPr>
+          <a:lstStyle/>
+          <a:p>
+            <a:pPr marL="0" marR="0" lvl="0" indent="0" algn="l" defTabSz="914400" rtl="0" eaLnBrk="1" fontAlgn="auto" latinLnBrk="0" hangingPunct="1">
+              <a:lnSpc>
+                <a:spcPct val="100000"/>
+              </a:lnSpc>
+              <a:spcBef>
+                <a:spcPts val="0"/>
+              </a:spcBef>
+              <a:spcAft>
+                <a:spcPts val="0"/>
+              </a:spcAft>
+              <a:buClrTx/>
+              <a:buSzTx/>
+              <a:buFontTx/>
+              <a:buNone/>
+              <a:tabLst/>
+              <a:defRPr/>
+            </a:pPr>
+            <a:r>
+              <a:rPr lang="en-US" sz="2800" dirty="0">
+                <a:solidFill>
+                  <a:prstClr val="black"/>
+                </a:solidFill>
+                <a:latin typeface="Calibri" panose="020F0502020204030204"/>
+              </a:rPr>
+              <a:t>,</a:t>
+            </a:r>
+            <a:r>
+              <a:rPr lang="en-US" sz="2800" dirty="0" err="1">
+                <a:solidFill>
+                  <a:prstClr val="black"/>
+                </a:solidFill>
+                <a:latin typeface="Calibri" panose="020F0502020204030204"/>
+              </a:rPr>
+              <a:t>n</a:t>
+            </a:r>
+            <a:r>
+              <a:rPr lang="en-US" sz="2800" baseline="-25000" dirty="0" err="1">
+                <a:solidFill>
+                  <a:prstClr val="black"/>
+                </a:solidFill>
+                <a:latin typeface="Calibri" panose="020F0502020204030204"/>
+              </a:rPr>
+              <a:t>t</a:t>
+            </a:r>
+            <a:endParaRPr kumimoji="0" lang="en-US" sz="4000" b="0" i="0" u="none" strike="noStrike" kern="1200" cap="none" spc="0" normalizeH="0" baseline="0" noProof="0" dirty="0">
+              <a:ln>
+                <a:noFill/>
+              </a:ln>
+              <a:solidFill>
+                <a:prstClr val="black"/>
+              </a:solidFill>
+              <a:effectLst/>
+              <a:uLnTx/>
+              <a:uFillTx/>
+              <a:latin typeface="Calibri" panose="020F0502020204030204"/>
+              <a:ea typeface="+mn-ea"/>
+              <a:cs typeface="+mn-cs"/>
+            </a:endParaRPr>
+          </a:p>
+        </p:txBody>
+      </p:sp>
+      <p:cxnSp>
+        <p:nvCxnSpPr>
+          <p:cNvPr id="70" name="Straight Connector 69">
+            <a:extLst>
+              <a:ext uri="{FF2B5EF4-FFF2-40B4-BE49-F238E27FC236}">
+                <a16:creationId xmlns:a16="http://schemas.microsoft.com/office/drawing/2014/main" id="{D0D072E3-0108-4B0D-A0F1-CA29F3226D84}"/>
+              </a:ext>
+            </a:extLst>
+          </p:cNvPr>
+          <p:cNvCxnSpPr>
+            <a:cxnSpLocks/>
+            <a:endCxn id="61" idx="1"/>
+          </p:cNvCxnSpPr>
+          <p:nvPr/>
+        </p:nvCxnSpPr>
+        <p:spPr>
+          <a:xfrm flipV="1">
+            <a:off x="9001900" y="2504313"/>
+            <a:ext cx="1860577" cy="543007"/>
+          </a:xfrm>
+          <a:prstGeom prst="line">
+            <a:avLst/>
+          </a:prstGeom>
+          <a:ln w="15875">
+            <a:solidFill>
+              <a:schemeClr val="tx1"/>
+            </a:solidFill>
+          </a:ln>
+        </p:spPr>
+        <p:style>
+          <a:lnRef idx="1">
+            <a:schemeClr val="accent1"/>
+          </a:lnRef>
+          <a:fillRef idx="0">
+            <a:schemeClr val="accent1"/>
+          </a:fillRef>
+          <a:effectRef idx="0">
+            <a:schemeClr val="accent1"/>
+          </a:effectRef>
+          <a:fontRef idx="minor">
+            <a:schemeClr val="tx1"/>
+          </a:fontRef>
+        </p:style>
+      </p:cxnSp>
+      <p:cxnSp>
+        <p:nvCxnSpPr>
+          <p:cNvPr id="71" name="Straight Connector 70">
+            <a:extLst>
+              <a:ext uri="{FF2B5EF4-FFF2-40B4-BE49-F238E27FC236}">
+                <a16:creationId xmlns:a16="http://schemas.microsoft.com/office/drawing/2014/main" id="{7F8A111E-498C-496E-BEA0-0275B09942CA}"/>
+              </a:ext>
+            </a:extLst>
+          </p:cNvPr>
+          <p:cNvCxnSpPr>
+            <a:cxnSpLocks/>
+            <a:endCxn id="67" idx="1"/>
+          </p:cNvCxnSpPr>
+          <p:nvPr/>
+        </p:nvCxnSpPr>
+        <p:spPr>
+          <a:xfrm>
+            <a:off x="8926679" y="3122795"/>
+            <a:ext cx="1921667" cy="313974"/>
+          </a:xfrm>
+          <a:prstGeom prst="line">
+            <a:avLst/>
+          </a:prstGeom>
+          <a:ln w="15875">
+            <a:solidFill>
+              <a:schemeClr val="tx1"/>
+            </a:solidFill>
+          </a:ln>
+        </p:spPr>
+        <p:style>
+          <a:lnRef idx="1">
+            <a:schemeClr val="accent1"/>
+          </a:lnRef>
+          <a:fillRef idx="0">
+            <a:schemeClr val="accent1"/>
+          </a:fillRef>
+          <a:effectRef idx="0">
+            <a:schemeClr val="accent1"/>
+          </a:effectRef>
+          <a:fontRef idx="minor">
+            <a:schemeClr val="tx1"/>
+          </a:fontRef>
+        </p:style>
+      </p:cxnSp>
     </p:spTree>
     <p:extLst>
       <p:ext uri="{BB962C8B-B14F-4D97-AF65-F5344CB8AC3E}">

</xml_diff>